<commit_message>
Build tab (almost) done.
</commit_message>
<xml_diff>
--- a/Design/20190312.SRP IDE - Visual Elements.pptx
+++ b/Design/20190312.SRP IDE - Visual Elements.pptx
@@ -276,7 +276,7 @@
           <a:p>
             <a:fld id="{D9B4A840-6C0E-48E8-AAAE-C0A3562974D6}" type="datetimeFigureOut">
               <a:rPr lang="en-GB" smtClean="0"/>
-              <a:t>20/05/2019</a:t>
+              <a:t>17/06/2019</a:t>
             </a:fld>
             <a:endParaRPr lang="en-GB"/>
           </a:p>
@@ -476,7 +476,7 @@
           <a:p>
             <a:fld id="{D9B4A840-6C0E-48E8-AAAE-C0A3562974D6}" type="datetimeFigureOut">
               <a:rPr lang="en-GB" smtClean="0"/>
-              <a:t>20/05/2019</a:t>
+              <a:t>17/06/2019</a:t>
             </a:fld>
             <a:endParaRPr lang="en-GB"/>
           </a:p>
@@ -686,7 +686,7 @@
           <a:p>
             <a:fld id="{D9B4A840-6C0E-48E8-AAAE-C0A3562974D6}" type="datetimeFigureOut">
               <a:rPr lang="en-GB" smtClean="0"/>
-              <a:t>20/05/2019</a:t>
+              <a:t>17/06/2019</a:t>
             </a:fld>
             <a:endParaRPr lang="en-GB"/>
           </a:p>
@@ -886,7 +886,7 @@
           <a:p>
             <a:fld id="{D9B4A840-6C0E-48E8-AAAE-C0A3562974D6}" type="datetimeFigureOut">
               <a:rPr lang="en-GB" smtClean="0"/>
-              <a:t>20/05/2019</a:t>
+              <a:t>17/06/2019</a:t>
             </a:fld>
             <a:endParaRPr lang="en-GB"/>
           </a:p>
@@ -1162,7 +1162,7 @@
           <a:p>
             <a:fld id="{D9B4A840-6C0E-48E8-AAAE-C0A3562974D6}" type="datetimeFigureOut">
               <a:rPr lang="en-GB" smtClean="0"/>
-              <a:t>20/05/2019</a:t>
+              <a:t>17/06/2019</a:t>
             </a:fld>
             <a:endParaRPr lang="en-GB"/>
           </a:p>
@@ -1430,7 +1430,7 @@
           <a:p>
             <a:fld id="{D9B4A840-6C0E-48E8-AAAE-C0A3562974D6}" type="datetimeFigureOut">
               <a:rPr lang="en-GB" smtClean="0"/>
-              <a:t>20/05/2019</a:t>
+              <a:t>17/06/2019</a:t>
             </a:fld>
             <a:endParaRPr lang="en-GB"/>
           </a:p>
@@ -1845,7 +1845,7 @@
           <a:p>
             <a:fld id="{D9B4A840-6C0E-48E8-AAAE-C0A3562974D6}" type="datetimeFigureOut">
               <a:rPr lang="en-GB" smtClean="0"/>
-              <a:t>20/05/2019</a:t>
+              <a:t>17/06/2019</a:t>
             </a:fld>
             <a:endParaRPr lang="en-GB"/>
           </a:p>
@@ -1987,7 +1987,7 @@
           <a:p>
             <a:fld id="{D9B4A840-6C0E-48E8-AAAE-C0A3562974D6}" type="datetimeFigureOut">
               <a:rPr lang="en-GB" smtClean="0"/>
-              <a:t>20/05/2019</a:t>
+              <a:t>17/06/2019</a:t>
             </a:fld>
             <a:endParaRPr lang="en-GB"/>
           </a:p>
@@ -2100,7 +2100,7 @@
           <a:p>
             <a:fld id="{D9B4A840-6C0E-48E8-AAAE-C0A3562974D6}" type="datetimeFigureOut">
               <a:rPr lang="en-GB" smtClean="0"/>
-              <a:t>20/05/2019</a:t>
+              <a:t>17/06/2019</a:t>
             </a:fld>
             <a:endParaRPr lang="en-GB"/>
           </a:p>
@@ -2413,7 +2413,7 @@
           <a:p>
             <a:fld id="{D9B4A840-6C0E-48E8-AAAE-C0A3562974D6}" type="datetimeFigureOut">
               <a:rPr lang="en-GB" smtClean="0"/>
-              <a:t>20/05/2019</a:t>
+              <a:t>17/06/2019</a:t>
             </a:fld>
             <a:endParaRPr lang="en-GB"/>
           </a:p>
@@ -2702,7 +2702,7 @@
           <a:p>
             <a:fld id="{D9B4A840-6C0E-48E8-AAAE-C0A3562974D6}" type="datetimeFigureOut">
               <a:rPr lang="en-GB" smtClean="0"/>
-              <a:t>20/05/2019</a:t>
+              <a:t>17/06/2019</a:t>
             </a:fld>
             <a:endParaRPr lang="en-GB"/>
           </a:p>
@@ -2945,7 +2945,7 @@
           <a:p>
             <a:fld id="{D9B4A840-6C0E-48E8-AAAE-C0A3562974D6}" type="datetimeFigureOut">
               <a:rPr lang="en-GB" smtClean="0"/>
-              <a:t>20/05/2019</a:t>
+              <a:t>17/06/2019</a:t>
             </a:fld>
             <a:endParaRPr lang="en-GB"/>
           </a:p>
@@ -4618,7 +4618,7 @@
         </p:blipFill>
         <p:spPr>
           <a:xfrm>
-            <a:off x="9511752" y="3157029"/>
+            <a:off x="8838103" y="3162300"/>
             <a:ext cx="771525" cy="533400"/>
           </a:xfrm>
           <a:prstGeom prst="rect">
@@ -4654,7 +4654,7 @@
         </p:blipFill>
         <p:spPr>
           <a:xfrm>
-            <a:off x="10442996" y="2638121"/>
+            <a:off x="9968738" y="3049219"/>
             <a:ext cx="647700" cy="838200"/>
           </a:xfrm>
           <a:prstGeom prst="rect">
@@ -4770,7 +4770,7 @@
         </p:blipFill>
         <p:spPr>
           <a:xfrm>
-            <a:off x="9897514" y="1454508"/>
+            <a:off x="9621864" y="1245864"/>
             <a:ext cx="990600" cy="942975"/>
           </a:xfrm>
           <a:prstGeom prst="rect">
@@ -6266,6 +6266,120 @@
           <a:xfrm>
             <a:off x="11203926" y="6169330"/>
             <a:ext cx="876300" cy="676275"/>
+          </a:xfrm>
+          <a:prstGeom prst="rect">
+            <a:avLst/>
+          </a:prstGeom>
+        </p:spPr>
+      </p:pic>
+      <p:pic>
+        <p:nvPicPr>
+          <p:cNvPr id="75" name="Graphic 74" descr="Mop and bucket">
+            <a:extLst>
+              <a:ext uri="{FF2B5EF4-FFF2-40B4-BE49-F238E27FC236}">
+                <a16:creationId xmlns:a16="http://schemas.microsoft.com/office/drawing/2014/main" id="{518A7A01-E67A-420D-9397-67C42595C2A0}"/>
+              </a:ext>
+            </a:extLst>
+          </p:cNvPr>
+          <p:cNvPicPr>
+            <a:picLocks noChangeAspect="1"/>
+          </p:cNvPicPr>
+          <p:nvPr/>
+        </p:nvPicPr>
+        <p:blipFill>
+          <a:blip r:embed="rId135">
+            <a:extLst>
+              <a:ext uri="{28A0092B-C50C-407E-A947-70E740481C1C}">
+                <a14:useLocalDpi xmlns:a14="http://schemas.microsoft.com/office/drawing/2010/main" val="0"/>
+              </a:ext>
+              <a:ext uri="{96DAC541-7B7A-43D3-8B79-37D633B846F1}">
+                <asvg:svgBlip xmlns:asvg="http://schemas.microsoft.com/office/drawing/2016/SVG/main" r:embed="rId136"/>
+              </a:ext>
+            </a:extLst>
+          </a:blip>
+          <a:stretch>
+            <a:fillRect/>
+          </a:stretch>
+        </p:blipFill>
+        <p:spPr>
+          <a:xfrm>
+            <a:off x="10793822" y="2375300"/>
+            <a:ext cx="914400" cy="914400"/>
+          </a:xfrm>
+          <a:prstGeom prst="rect">
+            <a:avLst/>
+          </a:prstGeom>
+        </p:spPr>
+      </p:pic>
+      <p:pic>
+        <p:nvPicPr>
+          <p:cNvPr id="79" name="Graphic 78" descr="Garbage">
+            <a:extLst>
+              <a:ext uri="{FF2B5EF4-FFF2-40B4-BE49-F238E27FC236}">
+                <a16:creationId xmlns:a16="http://schemas.microsoft.com/office/drawing/2014/main" id="{33C7BA07-EA3B-40B5-A9B1-D236A9F45114}"/>
+              </a:ext>
+            </a:extLst>
+          </p:cNvPr>
+          <p:cNvPicPr>
+            <a:picLocks noChangeAspect="1"/>
+          </p:cNvPicPr>
+          <p:nvPr/>
+        </p:nvPicPr>
+        <p:blipFill>
+          <a:blip r:embed="rId137">
+            <a:extLst>
+              <a:ext uri="{28A0092B-C50C-407E-A947-70E740481C1C}">
+                <a14:useLocalDpi xmlns:a14="http://schemas.microsoft.com/office/drawing/2010/main" val="0"/>
+              </a:ext>
+              <a:ext uri="{96DAC541-7B7A-43D3-8B79-37D633B846F1}">
+                <asvg:svgBlip xmlns:asvg="http://schemas.microsoft.com/office/drawing/2016/SVG/main" r:embed="rId138"/>
+              </a:ext>
+            </a:extLst>
+          </a:blip>
+          <a:stretch>
+            <a:fillRect/>
+          </a:stretch>
+        </p:blipFill>
+        <p:spPr>
+          <a:xfrm>
+            <a:off x="10700952" y="1538570"/>
+            <a:ext cx="914400" cy="914400"/>
+          </a:xfrm>
+          <a:prstGeom prst="rect">
+            <a:avLst/>
+          </a:prstGeom>
+        </p:spPr>
+      </p:pic>
+      <p:pic>
+        <p:nvPicPr>
+          <p:cNvPr id="82" name="Graphic 81">
+            <a:extLst>
+              <a:ext uri="{FF2B5EF4-FFF2-40B4-BE49-F238E27FC236}">
+                <a16:creationId xmlns:a16="http://schemas.microsoft.com/office/drawing/2014/main" id="{9F47221A-FC94-4FAD-B363-C9C4F73F65B8}"/>
+              </a:ext>
+            </a:extLst>
+          </p:cNvPr>
+          <p:cNvPicPr>
+            <a:picLocks noChangeAspect="1"/>
+          </p:cNvPicPr>
+          <p:nvPr/>
+        </p:nvPicPr>
+        <p:blipFill>
+          <a:blip r:embed="rId139">
+            <a:extLst>
+              <a:ext uri="{96DAC541-7B7A-43D3-8B79-37D633B846F1}">
+                <asvg:svgBlip xmlns:asvg="http://schemas.microsoft.com/office/drawing/2016/SVG/main" r:embed="rId140"/>
+              </a:ext>
+            </a:extLst>
+          </a:blip>
+          <a:stretch>
+            <a:fillRect/>
+          </a:stretch>
+        </p:blipFill>
+        <p:spPr>
+          <a:xfrm>
+            <a:off x="10288614" y="2424831"/>
+            <a:ext cx="457200" cy="457200"/>
           </a:xfrm>
           <a:prstGeom prst="rect">
             <a:avLst/>
@@ -8798,6 +8912,97 @@
           <a:xfrm>
             <a:off x="8497878" y="4142478"/>
             <a:ext cx="143866" cy="143866"/>
+          </a:xfrm>
+          <a:prstGeom prst="rect">
+            <a:avLst/>
+          </a:prstGeom>
+        </p:spPr>
+      </p:pic>
+      <p:sp>
+        <p:nvSpPr>
+          <p:cNvPr id="63" name="TextBox 62">
+            <a:extLst>
+              <a:ext uri="{FF2B5EF4-FFF2-40B4-BE49-F238E27FC236}">
+                <a16:creationId xmlns:a16="http://schemas.microsoft.com/office/drawing/2014/main" id="{2A597497-9724-43BE-86D8-6553A13D6519}"/>
+              </a:ext>
+            </a:extLst>
+          </p:cNvPr>
+          <p:cNvSpPr txBox="1"/>
+          <p:nvPr/>
+        </p:nvSpPr>
+        <p:spPr>
+          <a:xfrm>
+            <a:off x="8778027" y="5368553"/>
+            <a:ext cx="262800" cy="261610"/>
+          </a:xfrm>
+          <a:prstGeom prst="rect">
+            <a:avLst/>
+          </a:prstGeom>
+          <a:gradFill flip="none" rotWithShape="1">
+            <a:gsLst>
+              <a:gs pos="0">
+                <a:srgbClr val="484B4D"/>
+              </a:gs>
+              <a:gs pos="100000">
+                <a:srgbClr val="3C3D3F"/>
+              </a:gs>
+            </a:gsLst>
+            <a:lin ang="5400000" scaled="1"/>
+            <a:tileRect/>
+          </a:gradFill>
+          <a:effectLst>
+            <a:outerShdw blurRad="50800" dist="38100" dir="2700000" algn="tl" rotWithShape="0">
+              <a:prstClr val="black">
+                <a:alpha val="40000"/>
+              </a:prstClr>
+            </a:outerShdw>
+          </a:effectLst>
+        </p:spPr>
+        <p:txBody>
+          <a:bodyPr wrap="square" rtlCol="0">
+            <a:spAutoFit/>
+          </a:bodyPr>
+          <a:lstStyle/>
+          <a:p>
+            <a:pPr algn="ctr"/>
+            <a:endParaRPr lang="en-GB" sz="1100" dirty="0">
+              <a:solidFill>
+                <a:srgbClr val="CCCCCC"/>
+              </a:solidFill>
+            </a:endParaRPr>
+          </a:p>
+        </p:txBody>
+      </p:sp>
+      <p:pic>
+        <p:nvPicPr>
+          <p:cNvPr id="2" name="Graphic 1">
+            <a:extLst>
+              <a:ext uri="{FF2B5EF4-FFF2-40B4-BE49-F238E27FC236}">
+                <a16:creationId xmlns:a16="http://schemas.microsoft.com/office/drawing/2014/main" id="{FA32B706-DCBA-41AF-BC27-0197DFB8D00D}"/>
+              </a:ext>
+            </a:extLst>
+          </p:cNvPr>
+          <p:cNvPicPr>
+            <a:picLocks noChangeAspect="1"/>
+          </p:cNvPicPr>
+          <p:nvPr/>
+        </p:nvPicPr>
+        <p:blipFill>
+          <a:blip r:embed="rId34">
+            <a:extLst>
+              <a:ext uri="{96DAC541-7B7A-43D3-8B79-37D633B846F1}">
+                <asvg:svgBlip xmlns:asvg="http://schemas.microsoft.com/office/drawing/2016/SVG/main" r:embed="rId35"/>
+              </a:ext>
+            </a:extLst>
+          </a:blip>
+          <a:stretch>
+            <a:fillRect/>
+          </a:stretch>
+        </p:blipFill>
+        <p:spPr>
+          <a:xfrm>
+            <a:off x="8801427" y="5391358"/>
+            <a:ext cx="216000" cy="216000"/>
           </a:xfrm>
           <a:prstGeom prst="rect">
             <a:avLst/>

</xml_diff>

<commit_message>
Update of the CleanUp icon
</commit_message>
<xml_diff>
--- a/Design/20190312.SRP IDE - Visual Elements.pptx
+++ b/Design/20190312.SRP IDE - Visual Elements.pptx
@@ -6386,6 +6386,42 @@
           </a:prstGeom>
         </p:spPr>
       </p:pic>
+      <p:pic>
+        <p:nvPicPr>
+          <p:cNvPr id="83" name="Graphic 82">
+            <a:extLst>
+              <a:ext uri="{FF2B5EF4-FFF2-40B4-BE49-F238E27FC236}">
+                <a16:creationId xmlns:a16="http://schemas.microsoft.com/office/drawing/2014/main" id="{8BE85D46-ED5F-401C-A865-19D5B4F1CED2}"/>
+              </a:ext>
+            </a:extLst>
+          </p:cNvPr>
+          <p:cNvPicPr>
+            <a:picLocks noChangeAspect="1"/>
+          </p:cNvPicPr>
+          <p:nvPr/>
+        </p:nvPicPr>
+        <p:blipFill>
+          <a:blip r:embed="rId141">
+            <a:extLst>
+              <a:ext uri="{96DAC541-7B7A-43D3-8B79-37D633B846F1}">
+                <asvg:svgBlip xmlns:asvg="http://schemas.microsoft.com/office/drawing/2016/SVG/main" r:embed="rId142"/>
+              </a:ext>
+            </a:extLst>
+          </a:blip>
+          <a:stretch>
+            <a:fillRect/>
+          </a:stretch>
+        </p:blipFill>
+        <p:spPr>
+          <a:xfrm>
+            <a:off x="9639471" y="2426133"/>
+            <a:ext cx="457200" cy="451184"/>
+          </a:xfrm>
+          <a:prstGeom prst="rect">
+            <a:avLst/>
+          </a:prstGeom>
+        </p:spPr>
+      </p:pic>
     </p:spTree>
     <p:extLst>
       <p:ext uri="{BB962C8B-B14F-4D97-AF65-F5344CB8AC3E}">
@@ -8975,10 +9011,10 @@
       </p:sp>
       <p:pic>
         <p:nvPicPr>
-          <p:cNvPr id="2" name="Graphic 1">
-            <a:extLst>
-              <a:ext uri="{FF2B5EF4-FFF2-40B4-BE49-F238E27FC236}">
-                <a16:creationId xmlns:a16="http://schemas.microsoft.com/office/drawing/2014/main" id="{FA32B706-DCBA-41AF-BC27-0197DFB8D00D}"/>
+          <p:cNvPr id="3" name="Graphic 2">
+            <a:extLst>
+              <a:ext uri="{FF2B5EF4-FFF2-40B4-BE49-F238E27FC236}">
+                <a16:creationId xmlns:a16="http://schemas.microsoft.com/office/drawing/2014/main" id="{5055428A-9479-423F-AEB5-03B43B1582B0}"/>
               </a:ext>
             </a:extLst>
           </p:cNvPr>
@@ -9001,8 +9037,8 @@
         </p:blipFill>
         <p:spPr>
           <a:xfrm>
-            <a:off x="8801427" y="5391358"/>
-            <a:ext cx="216000" cy="216000"/>
+            <a:off x="8801427" y="5392779"/>
+            <a:ext cx="216000" cy="213158"/>
           </a:xfrm>
           <a:prstGeom prst="rect">
             <a:avLst/>

</xml_diff>